<commit_message>
modified:   librarySQL/datilibrary.sql 	modified:   librarySQL/procedurelibrary.sql 	modified:   librarySQL/schemalibrary.sql 	modified:   librarySQL/vistelibrary.sql 	deleted:    modello concettuale/E-R.erdplus 	new file:   modello logico/modello ER ristrutturato.png 	new file:   modello logico/modello relazionale.png
</commit_message>
<xml_diff>
--- a/modello logico/modello logico.pptx
+++ b/modello logico/modello logico.pptx
@@ -249,7 +249,7 @@
           <a:p>
             <a:fld id="{E39FA758-3CA8-4886-8D60-1A34E14D9217}" type="datetimeFigureOut">
               <a:rPr lang="it-IT" smtClean="0"/>
-              <a:t>21/06/2018</a:t>
+              <a:t>24/06/2018</a:t>
             </a:fld>
             <a:endParaRPr lang="it-IT" dirty="0"/>
           </a:p>
@@ -419,7 +419,7 @@
           <a:p>
             <a:fld id="{E39FA758-3CA8-4886-8D60-1A34E14D9217}" type="datetimeFigureOut">
               <a:rPr lang="it-IT" smtClean="0"/>
-              <a:t>21/06/2018</a:t>
+              <a:t>24/06/2018</a:t>
             </a:fld>
             <a:endParaRPr lang="it-IT" dirty="0"/>
           </a:p>
@@ -599,7 +599,7 @@
           <a:p>
             <a:fld id="{E39FA758-3CA8-4886-8D60-1A34E14D9217}" type="datetimeFigureOut">
               <a:rPr lang="it-IT" smtClean="0"/>
-              <a:t>21/06/2018</a:t>
+              <a:t>24/06/2018</a:t>
             </a:fld>
             <a:endParaRPr lang="it-IT" dirty="0"/>
           </a:p>
@@ -769,7 +769,7 @@
           <a:p>
             <a:fld id="{E39FA758-3CA8-4886-8D60-1A34E14D9217}" type="datetimeFigureOut">
               <a:rPr lang="it-IT" smtClean="0"/>
-              <a:t>21/06/2018</a:t>
+              <a:t>24/06/2018</a:t>
             </a:fld>
             <a:endParaRPr lang="it-IT" dirty="0"/>
           </a:p>
@@ -1013,7 +1013,7 @@
           <a:p>
             <a:fld id="{E39FA758-3CA8-4886-8D60-1A34E14D9217}" type="datetimeFigureOut">
               <a:rPr lang="it-IT" smtClean="0"/>
-              <a:t>21/06/2018</a:t>
+              <a:t>24/06/2018</a:t>
             </a:fld>
             <a:endParaRPr lang="it-IT" dirty="0"/>
           </a:p>
@@ -1245,7 +1245,7 @@
           <a:p>
             <a:fld id="{E39FA758-3CA8-4886-8D60-1A34E14D9217}" type="datetimeFigureOut">
               <a:rPr lang="it-IT" smtClean="0"/>
-              <a:t>21/06/2018</a:t>
+              <a:t>24/06/2018</a:t>
             </a:fld>
             <a:endParaRPr lang="it-IT" dirty="0"/>
           </a:p>
@@ -1612,7 +1612,7 @@
           <a:p>
             <a:fld id="{E39FA758-3CA8-4886-8D60-1A34E14D9217}" type="datetimeFigureOut">
               <a:rPr lang="it-IT" smtClean="0"/>
-              <a:t>21/06/2018</a:t>
+              <a:t>24/06/2018</a:t>
             </a:fld>
             <a:endParaRPr lang="it-IT" dirty="0"/>
           </a:p>
@@ -1730,7 +1730,7 @@
           <a:p>
             <a:fld id="{E39FA758-3CA8-4886-8D60-1A34E14D9217}" type="datetimeFigureOut">
               <a:rPr lang="it-IT" smtClean="0"/>
-              <a:t>21/06/2018</a:t>
+              <a:t>24/06/2018</a:t>
             </a:fld>
             <a:endParaRPr lang="it-IT" dirty="0"/>
           </a:p>
@@ -1825,7 +1825,7 @@
           <a:p>
             <a:fld id="{E39FA758-3CA8-4886-8D60-1A34E14D9217}" type="datetimeFigureOut">
               <a:rPr lang="it-IT" smtClean="0"/>
-              <a:t>21/06/2018</a:t>
+              <a:t>24/06/2018</a:t>
             </a:fld>
             <a:endParaRPr lang="it-IT" dirty="0"/>
           </a:p>
@@ -2102,7 +2102,7 @@
           <a:p>
             <a:fld id="{E39FA758-3CA8-4886-8D60-1A34E14D9217}" type="datetimeFigureOut">
               <a:rPr lang="it-IT" smtClean="0"/>
-              <a:t>21/06/2018</a:t>
+              <a:t>24/06/2018</a:t>
             </a:fld>
             <a:endParaRPr lang="it-IT" dirty="0"/>
           </a:p>
@@ -2359,7 +2359,7 @@
           <a:p>
             <a:fld id="{E39FA758-3CA8-4886-8D60-1A34E14D9217}" type="datetimeFigureOut">
               <a:rPr lang="it-IT" smtClean="0"/>
-              <a:t>21/06/2018</a:t>
+              <a:t>24/06/2018</a:t>
             </a:fld>
             <a:endParaRPr lang="it-IT" dirty="0"/>
           </a:p>
@@ -2572,7 +2572,7 @@
           <a:p>
             <a:fld id="{E39FA758-3CA8-4886-8D60-1A34E14D9217}" type="datetimeFigureOut">
               <a:rPr lang="it-IT" smtClean="0"/>
-              <a:t>21/06/2018</a:t>
+              <a:t>24/06/2018</a:t>
             </a:fld>
             <a:endParaRPr lang="it-IT" dirty="0"/>
           </a:p>
@@ -3135,7 +3135,15 @@
             </a:r>
             <a:r>
               <a:rPr lang="it-IT" dirty="0"/>
-              <a:t>, data_pubblicazione, numero_pagine, edizione, lingua)</a:t>
+              <a:t>, </a:t>
+            </a:r>
+            <a:r>
+              <a:rPr lang="it-IT" dirty="0" err="1"/>
+              <a:t>anno_pubblicazione</a:t>
+            </a:r>
+            <a:r>
+              <a:rPr lang="it-IT" dirty="0"/>
+              <a:t>, numero_pagine, edizione, lingua)</a:t>
             </a:r>
           </a:p>
           <a:p>
@@ -3161,7 +3169,15 @@
             </a:r>
             <a:r>
               <a:rPr lang="it-IT" dirty="0"/>
-              <a:t>, data_ristampa)</a:t>
+              <a:t>, </a:t>
+            </a:r>
+            <a:r>
+              <a:rPr lang="it-IT" dirty="0" err="1"/>
+              <a:t>anno_ristampa</a:t>
+            </a:r>
+            <a:r>
+              <a:rPr lang="it-IT" dirty="0"/>
+              <a:t>)</a:t>
             </a:r>
           </a:p>
           <a:p>
@@ -3257,7 +3273,15 @@
             </a:r>
             <a:r>
               <a:rPr lang="it-IT" dirty="0"/>
-              <a:t>, testo, data_recensione, ora, moderata)</a:t>
+              <a:t>, testo, </a:t>
+            </a:r>
+            <a:r>
+              <a:rPr lang="it-IT" dirty="0" err="1"/>
+              <a:t>data_ora</a:t>
+            </a:r>
+            <a:r>
+              <a:rPr lang="it-IT" dirty="0"/>
+              <a:t>, moderata)</a:t>
             </a:r>
           </a:p>
           <a:p>
@@ -3301,7 +3325,15 @@
             </a:r>
             <a:r>
               <a:rPr lang="it-IT" dirty="0"/>
-              <a:t>, data_like)</a:t>
+              <a:t>, </a:t>
+            </a:r>
+            <a:r>
+              <a:rPr lang="it-IT" dirty="0" err="1"/>
+              <a:t>data_ora</a:t>
+            </a:r>
+            <a:r>
+              <a:rPr lang="it-IT" dirty="0"/>
+              <a:t>)</a:t>
             </a:r>
           </a:p>
           <a:p>
@@ -3319,7 +3351,15 @@
             </a:r>
             <a:r>
               <a:rPr lang="it-IT" dirty="0"/>
-              <a:t>, id_utente, id_pubblicazione, timestamp, descrizione, tipo)</a:t>
+              <a:t>, id_utente, id_pubblicazione, </a:t>
+            </a:r>
+            <a:r>
+              <a:rPr lang="it-IT" dirty="0" err="1"/>
+              <a:t>data_ora</a:t>
+            </a:r>
+            <a:r>
+              <a:rPr lang="it-IT" dirty="0"/>
+              <a:t>, descrizione, tipo)</a:t>
             </a:r>
           </a:p>
         </p:txBody>
@@ -3591,11 +3631,11 @@
             <a:pPr lvl="1"/>
             <a:r>
               <a:rPr lang="it-IT" dirty="0" err="1"/>
-              <a:t>CharFormato</a:t>
-            </a:r>
-            <a:r>
-              <a:rPr lang="it-IT" dirty="0"/>
-              <a:t>: not null</a:t>
+              <a:t>Char</a:t>
+            </a:r>
+            <a:r>
+              <a:rPr lang="it-IT" dirty="0"/>
+              <a:t> Formato: not null</a:t>
             </a:r>
           </a:p>
           <a:p>

</xml_diff>